<commit_message>
Prepping at the coffeeshop.
</commit_message>
<xml_diff>
--- a/Appharbor.pptx
+++ b/Appharbor.pptx
@@ -296,7 +296,8 @@
           <a:p>
             <a:fld id="{41EEC140-9F13-4E39-AC20-1DD02114A281}" type="datetimeFigureOut">
               <a:rPr lang="en-US" smtClean="0"/>
-              <a:t>8/10/2011</a:t>
+              <a:pPr/>
+              <a:t>8/11/2011</a:t>
             </a:fld>
             <a:endParaRPr lang="en-US"/>
           </a:p>
@@ -338,6 +339,7 @@
           <a:p>
             <a:fld id="{4D8A4359-3ACC-472D-AD5E-DE522989C6E9}" type="slidenum">
               <a:rPr lang="en-US" smtClean="0"/>
+              <a:pPr/>
               <a:t>‹#›</a:t>
             </a:fld>
             <a:endParaRPr lang="en-US"/>
@@ -390,7 +392,7 @@
     </p:spTree>
     <p:extLst>
       <p:ext uri="{BB962C8B-B14F-4D97-AF65-F5344CB8AC3E}">
-        <p14:creationId xmlns:p14="http://schemas.microsoft.com/office/powerpoint/2010/main" val="1932798785"/>
+        <p14:creationId xmlns:p14="http://schemas.microsoft.com/office/powerpoint/2010/main" xmlns="" val="1932798785"/>
       </p:ext>
     </p:extLst>
   </p:cSld>
@@ -509,7 +511,8 @@
           <a:p>
             <a:fld id="{41EEC140-9F13-4E39-AC20-1DD02114A281}" type="datetimeFigureOut">
               <a:rPr lang="en-US" smtClean="0"/>
-              <a:t>8/10/2011</a:t>
+              <a:pPr/>
+              <a:t>8/11/2011</a:t>
             </a:fld>
             <a:endParaRPr lang="en-US"/>
           </a:p>
@@ -551,6 +554,7 @@
           <a:p>
             <a:fld id="{4D8A4359-3ACC-472D-AD5E-DE522989C6E9}" type="slidenum">
               <a:rPr lang="en-US" smtClean="0"/>
+              <a:pPr/>
               <a:t>‹#›</a:t>
             </a:fld>
             <a:endParaRPr lang="en-US"/>
@@ -560,7 +564,7 @@
     </p:spTree>
     <p:extLst>
       <p:ext uri="{BB962C8B-B14F-4D97-AF65-F5344CB8AC3E}">
-        <p14:creationId xmlns:p14="http://schemas.microsoft.com/office/powerpoint/2010/main" val="3808733739"/>
+        <p14:creationId xmlns:p14="http://schemas.microsoft.com/office/powerpoint/2010/main" xmlns="" val="3808733739"/>
       </p:ext>
     </p:extLst>
   </p:cSld>
@@ -689,7 +693,8 @@
           <a:p>
             <a:fld id="{41EEC140-9F13-4E39-AC20-1DD02114A281}" type="datetimeFigureOut">
               <a:rPr lang="en-US" smtClean="0"/>
-              <a:t>8/10/2011</a:t>
+              <a:pPr/>
+              <a:t>8/11/2011</a:t>
             </a:fld>
             <a:endParaRPr lang="en-US"/>
           </a:p>
@@ -731,6 +736,7 @@
           <a:p>
             <a:fld id="{4D8A4359-3ACC-472D-AD5E-DE522989C6E9}" type="slidenum">
               <a:rPr lang="en-US" smtClean="0"/>
+              <a:pPr/>
               <a:t>‹#›</a:t>
             </a:fld>
             <a:endParaRPr lang="en-US"/>
@@ -740,7 +746,7 @@
     </p:spTree>
     <p:extLst>
       <p:ext uri="{BB962C8B-B14F-4D97-AF65-F5344CB8AC3E}">
-        <p14:creationId xmlns:p14="http://schemas.microsoft.com/office/powerpoint/2010/main" val="4150480768"/>
+        <p14:creationId xmlns:p14="http://schemas.microsoft.com/office/powerpoint/2010/main" xmlns="" val="4150480768"/>
       </p:ext>
     </p:extLst>
   </p:cSld>
@@ -859,7 +865,8 @@
           <a:p>
             <a:fld id="{41EEC140-9F13-4E39-AC20-1DD02114A281}" type="datetimeFigureOut">
               <a:rPr lang="en-US" smtClean="0"/>
-              <a:t>8/10/2011</a:t>
+              <a:pPr/>
+              <a:t>8/11/2011</a:t>
             </a:fld>
             <a:endParaRPr lang="en-US"/>
           </a:p>
@@ -901,6 +908,7 @@
           <a:p>
             <a:fld id="{4D8A4359-3ACC-472D-AD5E-DE522989C6E9}" type="slidenum">
               <a:rPr lang="en-US" smtClean="0"/>
+              <a:pPr/>
               <a:t>‹#›</a:t>
             </a:fld>
             <a:endParaRPr lang="en-US"/>
@@ -910,7 +918,7 @@
     </p:spTree>
     <p:extLst>
       <p:ext uri="{BB962C8B-B14F-4D97-AF65-F5344CB8AC3E}">
-        <p14:creationId xmlns:p14="http://schemas.microsoft.com/office/powerpoint/2010/main" val="3828262200"/>
+        <p14:creationId xmlns:p14="http://schemas.microsoft.com/office/powerpoint/2010/main" xmlns="" val="3828262200"/>
       </p:ext>
     </p:extLst>
   </p:cSld>
@@ -1105,7 +1113,8 @@
           <a:p>
             <a:fld id="{41EEC140-9F13-4E39-AC20-1DD02114A281}" type="datetimeFigureOut">
               <a:rPr lang="en-US" smtClean="0"/>
-              <a:t>8/10/2011</a:t>
+              <a:pPr/>
+              <a:t>8/11/2011</a:t>
             </a:fld>
             <a:endParaRPr lang="en-US"/>
           </a:p>
@@ -1147,6 +1156,7 @@
           <a:p>
             <a:fld id="{4D8A4359-3ACC-472D-AD5E-DE522989C6E9}" type="slidenum">
               <a:rPr lang="en-US" smtClean="0"/>
+              <a:pPr/>
               <a:t>‹#›</a:t>
             </a:fld>
             <a:endParaRPr lang="en-US"/>
@@ -1156,7 +1166,7 @@
     </p:spTree>
     <p:extLst>
       <p:ext uri="{BB962C8B-B14F-4D97-AF65-F5344CB8AC3E}">
-        <p14:creationId xmlns:p14="http://schemas.microsoft.com/office/powerpoint/2010/main" val="3655444027"/>
+        <p14:creationId xmlns:p14="http://schemas.microsoft.com/office/powerpoint/2010/main" xmlns="" val="3655444027"/>
       </p:ext>
     </p:extLst>
   </p:cSld>
@@ -1393,7 +1403,8 @@
           <a:p>
             <a:fld id="{41EEC140-9F13-4E39-AC20-1DD02114A281}" type="datetimeFigureOut">
               <a:rPr lang="en-US" smtClean="0"/>
-              <a:t>8/10/2011</a:t>
+              <a:pPr/>
+              <a:t>8/11/2011</a:t>
             </a:fld>
             <a:endParaRPr lang="en-US"/>
           </a:p>
@@ -1435,6 +1446,7 @@
           <a:p>
             <a:fld id="{4D8A4359-3ACC-472D-AD5E-DE522989C6E9}" type="slidenum">
               <a:rPr lang="en-US" smtClean="0"/>
+              <a:pPr/>
               <a:t>‹#›</a:t>
             </a:fld>
             <a:endParaRPr lang="en-US"/>
@@ -1444,7 +1456,7 @@
     </p:spTree>
     <p:extLst>
       <p:ext uri="{BB962C8B-B14F-4D97-AF65-F5344CB8AC3E}">
-        <p14:creationId xmlns:p14="http://schemas.microsoft.com/office/powerpoint/2010/main" val="4118645835"/>
+        <p14:creationId xmlns:p14="http://schemas.microsoft.com/office/powerpoint/2010/main" xmlns="" val="4118645835"/>
       </p:ext>
     </p:extLst>
   </p:cSld>
@@ -1815,7 +1827,8 @@
           <a:p>
             <a:fld id="{41EEC140-9F13-4E39-AC20-1DD02114A281}" type="datetimeFigureOut">
               <a:rPr lang="en-US" smtClean="0"/>
-              <a:t>8/10/2011</a:t>
+              <a:pPr/>
+              <a:t>8/11/2011</a:t>
             </a:fld>
             <a:endParaRPr lang="en-US"/>
           </a:p>
@@ -1857,6 +1870,7 @@
           <a:p>
             <a:fld id="{4D8A4359-3ACC-472D-AD5E-DE522989C6E9}" type="slidenum">
               <a:rPr lang="en-US" smtClean="0"/>
+              <a:pPr/>
               <a:t>‹#›</a:t>
             </a:fld>
             <a:endParaRPr lang="en-US"/>
@@ -1866,7 +1880,7 @@
     </p:spTree>
     <p:extLst>
       <p:ext uri="{BB962C8B-B14F-4D97-AF65-F5344CB8AC3E}">
-        <p14:creationId xmlns:p14="http://schemas.microsoft.com/office/powerpoint/2010/main" val="3777512272"/>
+        <p14:creationId xmlns:p14="http://schemas.microsoft.com/office/powerpoint/2010/main" xmlns="" val="3777512272"/>
       </p:ext>
     </p:extLst>
   </p:cSld>
@@ -1933,7 +1947,8 @@
           <a:p>
             <a:fld id="{41EEC140-9F13-4E39-AC20-1DD02114A281}" type="datetimeFigureOut">
               <a:rPr lang="en-US" smtClean="0"/>
-              <a:t>8/10/2011</a:t>
+              <a:pPr/>
+              <a:t>8/11/2011</a:t>
             </a:fld>
             <a:endParaRPr lang="en-US"/>
           </a:p>
@@ -1975,6 +1990,7 @@
           <a:p>
             <a:fld id="{4D8A4359-3ACC-472D-AD5E-DE522989C6E9}" type="slidenum">
               <a:rPr lang="en-US" smtClean="0"/>
+              <a:pPr/>
               <a:t>‹#›</a:t>
             </a:fld>
             <a:endParaRPr lang="en-US"/>
@@ -1984,7 +2000,7 @@
     </p:spTree>
     <p:extLst>
       <p:ext uri="{BB962C8B-B14F-4D97-AF65-F5344CB8AC3E}">
-        <p14:creationId xmlns:p14="http://schemas.microsoft.com/office/powerpoint/2010/main" val="2405377940"/>
+        <p14:creationId xmlns:p14="http://schemas.microsoft.com/office/powerpoint/2010/main" xmlns="" val="2405377940"/>
       </p:ext>
     </p:extLst>
   </p:cSld>
@@ -2028,7 +2044,8 @@
           <a:p>
             <a:fld id="{41EEC140-9F13-4E39-AC20-1DD02114A281}" type="datetimeFigureOut">
               <a:rPr lang="en-US" smtClean="0"/>
-              <a:t>8/10/2011</a:t>
+              <a:pPr/>
+              <a:t>8/11/2011</a:t>
             </a:fld>
             <a:endParaRPr lang="en-US"/>
           </a:p>
@@ -2070,6 +2087,7 @@
           <a:p>
             <a:fld id="{4D8A4359-3ACC-472D-AD5E-DE522989C6E9}" type="slidenum">
               <a:rPr lang="en-US" smtClean="0"/>
+              <a:pPr/>
               <a:t>‹#›</a:t>
             </a:fld>
             <a:endParaRPr lang="en-US"/>
@@ -2079,7 +2097,7 @@
     </p:spTree>
     <p:extLst>
       <p:ext uri="{BB962C8B-B14F-4D97-AF65-F5344CB8AC3E}">
-        <p14:creationId xmlns:p14="http://schemas.microsoft.com/office/powerpoint/2010/main" val="2109208486"/>
+        <p14:creationId xmlns:p14="http://schemas.microsoft.com/office/powerpoint/2010/main" xmlns="" val="2109208486"/>
       </p:ext>
     </p:extLst>
   </p:cSld>
@@ -2305,7 +2323,8 @@
           <a:p>
             <a:fld id="{41EEC140-9F13-4E39-AC20-1DD02114A281}" type="datetimeFigureOut">
               <a:rPr lang="en-US" smtClean="0"/>
-              <a:t>8/10/2011</a:t>
+              <a:pPr/>
+              <a:t>8/11/2011</a:t>
             </a:fld>
             <a:endParaRPr lang="en-US"/>
           </a:p>
@@ -2347,6 +2366,7 @@
           <a:p>
             <a:fld id="{4D8A4359-3ACC-472D-AD5E-DE522989C6E9}" type="slidenum">
               <a:rPr lang="en-US" smtClean="0"/>
+              <a:pPr/>
               <a:t>‹#›</a:t>
             </a:fld>
             <a:endParaRPr lang="en-US"/>
@@ -2356,7 +2376,7 @@
     </p:spTree>
     <p:extLst>
       <p:ext uri="{BB962C8B-B14F-4D97-AF65-F5344CB8AC3E}">
-        <p14:creationId xmlns:p14="http://schemas.microsoft.com/office/powerpoint/2010/main" val="4153656341"/>
+        <p14:creationId xmlns:p14="http://schemas.microsoft.com/office/powerpoint/2010/main" xmlns="" val="4153656341"/>
       </p:ext>
     </p:extLst>
   </p:cSld>
@@ -2562,7 +2582,8 @@
           <a:p>
             <a:fld id="{41EEC140-9F13-4E39-AC20-1DD02114A281}" type="datetimeFigureOut">
               <a:rPr lang="en-US" smtClean="0"/>
-              <a:t>8/10/2011</a:t>
+              <a:pPr/>
+              <a:t>8/11/2011</a:t>
             </a:fld>
             <a:endParaRPr lang="en-US"/>
           </a:p>
@@ -2604,6 +2625,7 @@
           <a:p>
             <a:fld id="{4D8A4359-3ACC-472D-AD5E-DE522989C6E9}" type="slidenum">
               <a:rPr lang="en-US" smtClean="0"/>
+              <a:pPr/>
               <a:t>‹#›</a:t>
             </a:fld>
             <a:endParaRPr lang="en-US"/>
@@ -2613,7 +2635,7 @@
     </p:spTree>
     <p:extLst>
       <p:ext uri="{BB962C8B-B14F-4D97-AF65-F5344CB8AC3E}">
-        <p14:creationId xmlns:p14="http://schemas.microsoft.com/office/powerpoint/2010/main" val="2039532634"/>
+        <p14:creationId xmlns:p14="http://schemas.microsoft.com/office/powerpoint/2010/main" xmlns="" val="2039532634"/>
       </p:ext>
     </p:extLst>
   </p:cSld>
@@ -2835,7 +2857,8 @@
           <a:p>
             <a:fld id="{41EEC140-9F13-4E39-AC20-1DD02114A281}" type="datetimeFigureOut">
               <a:rPr lang="en-US" smtClean="0"/>
-              <a:t>8/10/2011</a:t>
+              <a:pPr/>
+              <a:t>8/11/2011</a:t>
             </a:fld>
             <a:endParaRPr lang="en-US"/>
           </a:p>
@@ -2913,6 +2936,7 @@
           <a:p>
             <a:fld id="{4D8A4359-3ACC-472D-AD5E-DE522989C6E9}" type="slidenum">
               <a:rPr lang="en-US" smtClean="0"/>
+              <a:pPr/>
               <a:t>‹#›</a:t>
             </a:fld>
             <a:endParaRPr lang="en-US"/>
@@ -2922,7 +2946,7 @@
     </p:spTree>
     <p:extLst>
       <p:ext uri="{BB962C8B-B14F-4D97-AF65-F5344CB8AC3E}">
-        <p14:creationId xmlns:p14="http://schemas.microsoft.com/office/powerpoint/2010/main" val="3084834360"/>
+        <p14:creationId xmlns:p14="http://schemas.microsoft.com/office/powerpoint/2010/main" xmlns="" val="3084834360"/>
       </p:ext>
     </p:extLst>
   </p:cSld>
@@ -3269,7 +3293,7 @@
     </p:spTree>
     <p:extLst>
       <p:ext uri="{BB962C8B-B14F-4D97-AF65-F5344CB8AC3E}">
-        <p14:creationId xmlns:p14="http://schemas.microsoft.com/office/powerpoint/2010/main" val="3360892921"/>
+        <p14:creationId xmlns:p14="http://schemas.microsoft.com/office/powerpoint/2010/main" xmlns="" val="3360892921"/>
       </p:ext>
     </p:extLst>
   </p:cSld>
@@ -3367,8 +3391,16 @@
               <a:buNone/>
             </a:pPr>
             <a:r>
+              <a:rPr lang="en-US" smtClean="0"/>
+              <a:t> </a:t>
+            </a:r>
+            <a:r>
+              <a:rPr lang="en-US" smtClean="0"/>
+              <a:t>Developer </a:t>
+            </a:r>
+            <a:r>
               <a:rPr lang="en-US" dirty="0" smtClean="0"/>
-              <a:t> Lead Developer @ </a:t>
+              <a:t>@ </a:t>
             </a:r>
             <a:r>
               <a:rPr lang="en-US" i="1" dirty="0" err="1" smtClean="0"/>
@@ -3438,7 +3470,7 @@
     </p:spTree>
     <p:extLst>
       <p:ext uri="{BB962C8B-B14F-4D97-AF65-F5344CB8AC3E}">
-        <p14:creationId xmlns:p14="http://schemas.microsoft.com/office/powerpoint/2010/main" val="2098702085"/>
+        <p14:creationId xmlns:p14="http://schemas.microsoft.com/office/powerpoint/2010/main" xmlns="" val="2098702085"/>
       </p:ext>
     </p:extLst>
   </p:cSld>
@@ -3610,7 +3642,7 @@
           <a:blip r:embed="rId2" cstate="print">
             <a:extLst>
               <a:ext uri="{28A0092B-C50C-407E-A947-70E740481C1C}">
-                <a14:useLocalDpi xmlns:a14="http://schemas.microsoft.com/office/drawing/2010/main" val="0"/>
+                <a14:useLocalDpi xmlns:a14="http://schemas.microsoft.com/office/drawing/2010/main" xmlns="" val="0"/>
               </a:ext>
             </a:extLst>
           </a:blip>
@@ -3634,14 +3666,14 @@
           <a:effectLst/>
           <a:extLst>
             <a:ext uri="{909E8E84-426E-40DD-AFC4-6F175D3DCCD1}">
-              <a14:hiddenFill xmlns:a14="http://schemas.microsoft.com/office/drawing/2010/main">
+              <a14:hiddenFill xmlns:a14="http://schemas.microsoft.com/office/drawing/2010/main" xmlns="">
                 <a:solidFill>
                   <a:schemeClr val="accent1"/>
                 </a:solidFill>
               </a14:hiddenFill>
             </a:ext>
             <a:ext uri="{91240B29-F687-4F45-9708-019B960494DF}">
-              <a14:hiddenLine xmlns:a14="http://schemas.microsoft.com/office/drawing/2010/main" w="9525">
+              <a14:hiddenLine xmlns:a14="http://schemas.microsoft.com/office/drawing/2010/main" xmlns="" w="9525">
                 <a:solidFill>
                   <a:schemeClr val="tx1"/>
                 </a:solidFill>
@@ -3651,7 +3683,7 @@
               </a14:hiddenLine>
             </a:ext>
             <a:ext uri="{AF507438-7753-43E0-B8FC-AC1667EBCBE1}">
-              <a14:hiddenEffects xmlns:a14="http://schemas.microsoft.com/office/drawing/2010/main">
+              <a14:hiddenEffects xmlns:a14="http://schemas.microsoft.com/office/drawing/2010/main" xmlns="">
                 <a:effectLst>
                   <a:outerShdw dist="35921" dir="2700000" algn="ctr" rotWithShape="0">
                     <a:schemeClr val="bg2"/>
@@ -3665,7 +3697,7 @@
     </p:spTree>
     <p:extLst>
       <p:ext uri="{BB962C8B-B14F-4D97-AF65-F5344CB8AC3E}">
-        <p14:creationId xmlns:p14="http://schemas.microsoft.com/office/powerpoint/2010/main" val="1529878310"/>
+        <p14:creationId xmlns:p14="http://schemas.microsoft.com/office/powerpoint/2010/main" xmlns="" val="1529878310"/>
       </p:ext>
     </p:extLst>
   </p:cSld>
@@ -3716,11 +3748,7 @@
           <a:p>
             <a:r>
               <a:rPr lang="en-US" dirty="0" smtClean="0"/>
-              <a:t>Other </a:t>
-            </a:r>
-            <a:r>
-              <a:rPr lang="en-US" dirty="0" smtClean="0"/>
-              <a:t>Options</a:t>
+              <a:t>Other Options</a:t>
             </a:r>
             <a:endParaRPr lang="en-US" dirty="0"/>
           </a:p>
@@ -3757,10 +3785,10 @@
           <p:nvPr/>
         </p:nvPicPr>
         <p:blipFill>
-          <a:blip r:embed="rId2">
+          <a:blip r:embed="rId2" cstate="print">
             <a:extLst>
               <a:ext uri="{28A0092B-C50C-407E-A947-70E740481C1C}">
-                <a14:useLocalDpi xmlns:a14="http://schemas.microsoft.com/office/drawing/2010/main" val="0"/>
+                <a14:useLocalDpi xmlns:a14="http://schemas.microsoft.com/office/drawing/2010/main" xmlns="" val="0"/>
               </a:ext>
             </a:extLst>
           </a:blip>
@@ -3784,14 +3812,14 @@
           <a:effectLst/>
           <a:extLst>
             <a:ext uri="{909E8E84-426E-40DD-AFC4-6F175D3DCCD1}">
-              <a14:hiddenFill xmlns:a14="http://schemas.microsoft.com/office/drawing/2010/main">
+              <a14:hiddenFill xmlns:a14="http://schemas.microsoft.com/office/drawing/2010/main" xmlns="">
                 <a:solidFill>
                   <a:schemeClr val="accent1"/>
                 </a:solidFill>
               </a14:hiddenFill>
             </a:ext>
             <a:ext uri="{91240B29-F687-4F45-9708-019B960494DF}">
-              <a14:hiddenLine xmlns:a14="http://schemas.microsoft.com/office/drawing/2010/main" w="9525">
+              <a14:hiddenLine xmlns:a14="http://schemas.microsoft.com/office/drawing/2010/main" xmlns="" w="9525">
                 <a:solidFill>
                   <a:schemeClr val="tx1"/>
                 </a:solidFill>
@@ -3801,7 +3829,7 @@
               </a14:hiddenLine>
             </a:ext>
             <a:ext uri="{AF507438-7753-43E0-B8FC-AC1667EBCBE1}">
-              <a14:hiddenEffects xmlns:a14="http://schemas.microsoft.com/office/drawing/2010/main">
+              <a14:hiddenEffects xmlns:a14="http://schemas.microsoft.com/office/drawing/2010/main" xmlns="">
                 <a:effectLst>
                   <a:outerShdw dist="35921" dir="2700000" algn="ctr" rotWithShape="0">
                     <a:schemeClr val="bg2"/>
@@ -3821,10 +3849,10 @@
           <p:nvPr/>
         </p:nvPicPr>
         <p:blipFill>
-          <a:blip r:embed="rId3">
+          <a:blip r:embed="rId3" cstate="print">
             <a:extLst>
               <a:ext uri="{28A0092B-C50C-407E-A947-70E740481C1C}">
-                <a14:useLocalDpi xmlns:a14="http://schemas.microsoft.com/office/drawing/2010/main" val="0"/>
+                <a14:useLocalDpi xmlns:a14="http://schemas.microsoft.com/office/drawing/2010/main" xmlns="" val="0"/>
               </a:ext>
             </a:extLst>
           </a:blip>
@@ -3848,14 +3876,14 @@
           <a:effectLst/>
           <a:extLst>
             <a:ext uri="{909E8E84-426E-40DD-AFC4-6F175D3DCCD1}">
-              <a14:hiddenFill xmlns:a14="http://schemas.microsoft.com/office/drawing/2010/main">
+              <a14:hiddenFill xmlns:a14="http://schemas.microsoft.com/office/drawing/2010/main" xmlns="">
                 <a:solidFill>
                   <a:schemeClr val="accent1"/>
                 </a:solidFill>
               </a14:hiddenFill>
             </a:ext>
             <a:ext uri="{91240B29-F687-4F45-9708-019B960494DF}">
-              <a14:hiddenLine xmlns:a14="http://schemas.microsoft.com/office/drawing/2010/main" w="9525">
+              <a14:hiddenLine xmlns:a14="http://schemas.microsoft.com/office/drawing/2010/main" xmlns="" w="9525">
                 <a:solidFill>
                   <a:schemeClr val="tx1"/>
                 </a:solidFill>
@@ -3865,7 +3893,7 @@
               </a14:hiddenLine>
             </a:ext>
             <a:ext uri="{AF507438-7753-43E0-B8FC-AC1667EBCBE1}">
-              <a14:hiddenEffects xmlns:a14="http://schemas.microsoft.com/office/drawing/2010/main">
+              <a14:hiddenEffects xmlns:a14="http://schemas.microsoft.com/office/drawing/2010/main" xmlns="">
                 <a:effectLst>
                   <a:outerShdw dist="35921" dir="2700000" algn="ctr" rotWithShape="0">
                     <a:schemeClr val="bg2"/>
@@ -3885,10 +3913,10 @@
           <p:nvPr/>
         </p:nvPicPr>
         <p:blipFill>
-          <a:blip r:embed="rId4">
+          <a:blip r:embed="rId4" cstate="print">
             <a:extLst>
               <a:ext uri="{28A0092B-C50C-407E-A947-70E740481C1C}">
-                <a14:useLocalDpi xmlns:a14="http://schemas.microsoft.com/office/drawing/2010/main" val="0"/>
+                <a14:useLocalDpi xmlns:a14="http://schemas.microsoft.com/office/drawing/2010/main" xmlns="" val="0"/>
               </a:ext>
             </a:extLst>
           </a:blip>
@@ -3912,14 +3940,14 @@
           <a:effectLst/>
           <a:extLst>
             <a:ext uri="{909E8E84-426E-40DD-AFC4-6F175D3DCCD1}">
-              <a14:hiddenFill xmlns:a14="http://schemas.microsoft.com/office/drawing/2010/main">
+              <a14:hiddenFill xmlns:a14="http://schemas.microsoft.com/office/drawing/2010/main" xmlns="">
                 <a:solidFill>
                   <a:schemeClr val="accent1"/>
                 </a:solidFill>
               </a14:hiddenFill>
             </a:ext>
             <a:ext uri="{91240B29-F687-4F45-9708-019B960494DF}">
-              <a14:hiddenLine xmlns:a14="http://schemas.microsoft.com/office/drawing/2010/main" w="9525">
+              <a14:hiddenLine xmlns:a14="http://schemas.microsoft.com/office/drawing/2010/main" xmlns="" w="9525">
                 <a:solidFill>
                   <a:schemeClr val="tx1"/>
                 </a:solidFill>
@@ -3929,7 +3957,7 @@
               </a14:hiddenLine>
             </a:ext>
             <a:ext uri="{AF507438-7753-43E0-B8FC-AC1667EBCBE1}">
-              <a14:hiddenEffects xmlns:a14="http://schemas.microsoft.com/office/drawing/2010/main">
+              <a14:hiddenEffects xmlns:a14="http://schemas.microsoft.com/office/drawing/2010/main" xmlns="">
                 <a:effectLst>
                   <a:outerShdw dist="35921" dir="2700000" algn="ctr" rotWithShape="0">
                     <a:schemeClr val="bg2"/>
@@ -3949,10 +3977,10 @@
           <p:nvPr/>
         </p:nvPicPr>
         <p:blipFill>
-          <a:blip r:embed="rId5">
+          <a:blip r:embed="rId5" cstate="print">
             <a:extLst>
               <a:ext uri="{28A0092B-C50C-407E-A947-70E740481C1C}">
-                <a14:useLocalDpi xmlns:a14="http://schemas.microsoft.com/office/drawing/2010/main" val="0"/>
+                <a14:useLocalDpi xmlns:a14="http://schemas.microsoft.com/office/drawing/2010/main" xmlns="" val="0"/>
               </a:ext>
             </a:extLst>
           </a:blip>
@@ -3976,14 +4004,14 @@
           <a:effectLst/>
           <a:extLst>
             <a:ext uri="{909E8E84-426E-40DD-AFC4-6F175D3DCCD1}">
-              <a14:hiddenFill xmlns:a14="http://schemas.microsoft.com/office/drawing/2010/main">
+              <a14:hiddenFill xmlns:a14="http://schemas.microsoft.com/office/drawing/2010/main" xmlns="">
                 <a:solidFill>
                   <a:schemeClr val="accent1"/>
                 </a:solidFill>
               </a14:hiddenFill>
             </a:ext>
             <a:ext uri="{91240B29-F687-4F45-9708-019B960494DF}">
-              <a14:hiddenLine xmlns:a14="http://schemas.microsoft.com/office/drawing/2010/main" w="9525">
+              <a14:hiddenLine xmlns:a14="http://schemas.microsoft.com/office/drawing/2010/main" xmlns="" w="9525">
                 <a:solidFill>
                   <a:schemeClr val="tx1"/>
                 </a:solidFill>
@@ -3993,7 +4021,7 @@
               </a14:hiddenLine>
             </a:ext>
             <a:ext uri="{AF507438-7753-43E0-B8FC-AC1667EBCBE1}">
-              <a14:hiddenEffects xmlns:a14="http://schemas.microsoft.com/office/drawing/2010/main">
+              <a14:hiddenEffects xmlns:a14="http://schemas.microsoft.com/office/drawing/2010/main" xmlns="">
                 <a:effectLst>
                   <a:outerShdw dist="35921" dir="2700000" algn="ctr" rotWithShape="0">
                     <a:schemeClr val="bg2"/>
@@ -4013,10 +4041,10 @@
           <p:nvPr/>
         </p:nvPicPr>
         <p:blipFill>
-          <a:blip r:embed="rId6">
+          <a:blip r:embed="rId6" cstate="print">
             <a:extLst>
               <a:ext uri="{28A0092B-C50C-407E-A947-70E740481C1C}">
-                <a14:useLocalDpi xmlns:a14="http://schemas.microsoft.com/office/drawing/2010/main" val="0"/>
+                <a14:useLocalDpi xmlns:a14="http://schemas.microsoft.com/office/drawing/2010/main" xmlns="" val="0"/>
               </a:ext>
             </a:extLst>
           </a:blip>
@@ -4040,14 +4068,14 @@
           <a:effectLst/>
           <a:extLst>
             <a:ext uri="{909E8E84-426E-40DD-AFC4-6F175D3DCCD1}">
-              <a14:hiddenFill xmlns:a14="http://schemas.microsoft.com/office/drawing/2010/main">
+              <a14:hiddenFill xmlns:a14="http://schemas.microsoft.com/office/drawing/2010/main" xmlns="">
                 <a:solidFill>
                   <a:schemeClr val="accent1"/>
                 </a:solidFill>
               </a14:hiddenFill>
             </a:ext>
             <a:ext uri="{91240B29-F687-4F45-9708-019B960494DF}">
-              <a14:hiddenLine xmlns:a14="http://schemas.microsoft.com/office/drawing/2010/main" w="9525">
+              <a14:hiddenLine xmlns:a14="http://schemas.microsoft.com/office/drawing/2010/main" xmlns="" w="9525">
                 <a:solidFill>
                   <a:schemeClr val="tx1"/>
                 </a:solidFill>
@@ -4057,7 +4085,7 @@
               </a14:hiddenLine>
             </a:ext>
             <a:ext uri="{AF507438-7753-43E0-B8FC-AC1667EBCBE1}">
-              <a14:hiddenEffects xmlns:a14="http://schemas.microsoft.com/office/drawing/2010/main">
+              <a14:hiddenEffects xmlns:a14="http://schemas.microsoft.com/office/drawing/2010/main" xmlns="">
                 <a:effectLst>
                   <a:outerShdw dist="35921" dir="2700000" algn="ctr" rotWithShape="0">
                     <a:schemeClr val="bg2"/>
@@ -4071,7 +4099,7 @@
     </p:spTree>
     <p:extLst>
       <p:ext uri="{BB962C8B-B14F-4D97-AF65-F5344CB8AC3E}">
-        <p14:creationId xmlns:p14="http://schemas.microsoft.com/office/powerpoint/2010/main" val="2243595371"/>
+        <p14:creationId xmlns:p14="http://schemas.microsoft.com/office/powerpoint/2010/main" xmlns="" val="2243595371"/>
       </p:ext>
     </p:extLst>
   </p:cSld>
@@ -4207,11 +4235,7 @@
             </a:r>
             <a:r>
               <a:rPr lang="en-US" sz="1800" i="1" dirty="0" smtClean="0"/>
-              <a:t>(beta</a:t>
-            </a:r>
-            <a:r>
-              <a:rPr lang="en-US" sz="1800" i="1" dirty="0" smtClean="0"/>
-              <a:t>)</a:t>
+              <a:t>(beta)</a:t>
             </a:r>
             <a:r>
               <a:rPr lang="en-US" dirty="0" smtClean="0"/>
@@ -4232,7 +4256,7 @@
     </p:spTree>
     <p:extLst>
       <p:ext uri="{BB962C8B-B14F-4D97-AF65-F5344CB8AC3E}">
-        <p14:creationId xmlns:p14="http://schemas.microsoft.com/office/powerpoint/2010/main" val="3297738224"/>
+        <p14:creationId xmlns:p14="http://schemas.microsoft.com/office/powerpoint/2010/main" xmlns="" val="3297738224"/>
       </p:ext>
     </p:extLst>
   </p:cSld>
@@ -4441,7 +4465,7 @@
     </p:spTree>
     <p:extLst>
       <p:ext uri="{BB962C8B-B14F-4D97-AF65-F5344CB8AC3E}">
-        <p14:creationId xmlns:p14="http://schemas.microsoft.com/office/powerpoint/2010/main" val="2157939152"/>
+        <p14:creationId xmlns:p14="http://schemas.microsoft.com/office/powerpoint/2010/main" xmlns="" val="2157939152"/>
       </p:ext>
     </p:extLst>
   </p:cSld>
@@ -4581,10 +4605,10 @@
           <p:nvPr/>
         </p:nvPicPr>
         <p:blipFill>
-          <a:blip r:embed="rId2">
+          <a:blip r:embed="rId2" cstate="print">
             <a:extLst>
               <a:ext uri="{28A0092B-C50C-407E-A947-70E740481C1C}">
-                <a14:useLocalDpi xmlns:a14="http://schemas.microsoft.com/office/drawing/2010/main" val="0"/>
+                <a14:useLocalDpi xmlns:a14="http://schemas.microsoft.com/office/drawing/2010/main" xmlns="" val="0"/>
               </a:ext>
             </a:extLst>
           </a:blip>
@@ -4608,14 +4632,14 @@
           <a:effectLst/>
           <a:extLst>
             <a:ext uri="{909E8E84-426E-40DD-AFC4-6F175D3DCCD1}">
-              <a14:hiddenFill xmlns:a14="http://schemas.microsoft.com/office/drawing/2010/main">
+              <a14:hiddenFill xmlns:a14="http://schemas.microsoft.com/office/drawing/2010/main" xmlns="">
                 <a:solidFill>
                   <a:schemeClr val="accent1"/>
                 </a:solidFill>
               </a14:hiddenFill>
             </a:ext>
             <a:ext uri="{91240B29-F687-4F45-9708-019B960494DF}">
-              <a14:hiddenLine xmlns:a14="http://schemas.microsoft.com/office/drawing/2010/main" w="9525">
+              <a14:hiddenLine xmlns:a14="http://schemas.microsoft.com/office/drawing/2010/main" xmlns="" w="9525">
                 <a:solidFill>
                   <a:schemeClr val="tx1"/>
                 </a:solidFill>
@@ -4625,7 +4649,7 @@
               </a14:hiddenLine>
             </a:ext>
             <a:ext uri="{AF507438-7753-43E0-B8FC-AC1667EBCBE1}">
-              <a14:hiddenEffects xmlns:a14="http://schemas.microsoft.com/office/drawing/2010/main">
+              <a14:hiddenEffects xmlns:a14="http://schemas.microsoft.com/office/drawing/2010/main" xmlns="">
                 <a:effectLst>
                   <a:outerShdw dist="35921" dir="2700000" algn="ctr" rotWithShape="0">
                     <a:schemeClr val="bg2"/>
@@ -4639,7 +4663,7 @@
     </p:spTree>
     <p:extLst>
       <p:ext uri="{BB962C8B-B14F-4D97-AF65-F5344CB8AC3E}">
-        <p14:creationId xmlns:p14="http://schemas.microsoft.com/office/powerpoint/2010/main" val="154758064"/>
+        <p14:creationId xmlns:p14="http://schemas.microsoft.com/office/powerpoint/2010/main" xmlns="" val="154758064"/>
       </p:ext>
     </p:extLst>
   </p:cSld>
@@ -4707,10 +4731,10 @@
           </p:nvPr>
         </p:nvPicPr>
         <p:blipFill>
-          <a:blip r:embed="rId2">
+          <a:blip r:embed="rId2" cstate="print">
             <a:extLst>
               <a:ext uri="{28A0092B-C50C-407E-A947-70E740481C1C}">
-                <a14:useLocalDpi xmlns:a14="http://schemas.microsoft.com/office/drawing/2010/main" val="0"/>
+                <a14:useLocalDpi xmlns:a14="http://schemas.microsoft.com/office/drawing/2010/main" xmlns="" val="0"/>
               </a:ext>
             </a:extLst>
           </a:blip>
@@ -4734,14 +4758,14 @@
           <a:effectLst/>
           <a:extLst>
             <a:ext uri="{909E8E84-426E-40DD-AFC4-6F175D3DCCD1}">
-              <a14:hiddenFill xmlns:a14="http://schemas.microsoft.com/office/drawing/2010/main">
+              <a14:hiddenFill xmlns:a14="http://schemas.microsoft.com/office/drawing/2010/main" xmlns="">
                 <a:solidFill>
                   <a:schemeClr val="accent1"/>
                 </a:solidFill>
               </a14:hiddenFill>
             </a:ext>
             <a:ext uri="{91240B29-F687-4F45-9708-019B960494DF}">
-              <a14:hiddenLine xmlns:a14="http://schemas.microsoft.com/office/drawing/2010/main" w="9525">
+              <a14:hiddenLine xmlns:a14="http://schemas.microsoft.com/office/drawing/2010/main" xmlns="" w="9525">
                 <a:solidFill>
                   <a:schemeClr val="tx1"/>
                 </a:solidFill>
@@ -4751,7 +4775,7 @@
               </a14:hiddenLine>
             </a:ext>
             <a:ext uri="{AF507438-7753-43E0-B8FC-AC1667EBCBE1}">
-              <a14:hiddenEffects xmlns:a14="http://schemas.microsoft.com/office/drawing/2010/main">
+              <a14:hiddenEffects xmlns:a14="http://schemas.microsoft.com/office/drawing/2010/main" xmlns="">
                 <a:effectLst>
                   <a:outerShdw dist="35921" dir="2700000" algn="ctr" rotWithShape="0">
                     <a:schemeClr val="bg2"/>
@@ -4765,7 +4789,7 @@
     </p:spTree>
     <p:extLst>
       <p:ext uri="{BB962C8B-B14F-4D97-AF65-F5344CB8AC3E}">
-        <p14:creationId xmlns:p14="http://schemas.microsoft.com/office/powerpoint/2010/main" val="1338889198"/>
+        <p14:creationId xmlns:p14="http://schemas.microsoft.com/office/powerpoint/2010/main" xmlns="" val="1338889198"/>
       </p:ext>
     </p:extLst>
   </p:cSld>
@@ -4859,10 +4883,10 @@
           <p:nvPr/>
         </p:nvPicPr>
         <p:blipFill>
-          <a:blip r:embed="rId2">
+          <a:blip r:embed="rId2" cstate="print">
             <a:extLst>
               <a:ext uri="{28A0092B-C50C-407E-A947-70E740481C1C}">
-                <a14:useLocalDpi xmlns:a14="http://schemas.microsoft.com/office/drawing/2010/main" val="0"/>
+                <a14:useLocalDpi xmlns:a14="http://schemas.microsoft.com/office/drawing/2010/main" xmlns="" val="0"/>
               </a:ext>
             </a:extLst>
           </a:blip>
@@ -4886,14 +4910,14 @@
           <a:effectLst/>
           <a:extLst>
             <a:ext uri="{909E8E84-426E-40DD-AFC4-6F175D3DCCD1}">
-              <a14:hiddenFill xmlns:a14="http://schemas.microsoft.com/office/drawing/2010/main">
+              <a14:hiddenFill xmlns:a14="http://schemas.microsoft.com/office/drawing/2010/main" xmlns="">
                 <a:solidFill>
                   <a:schemeClr val="accent1"/>
                 </a:solidFill>
               </a14:hiddenFill>
             </a:ext>
             <a:ext uri="{91240B29-F687-4F45-9708-019B960494DF}">
-              <a14:hiddenLine xmlns:a14="http://schemas.microsoft.com/office/drawing/2010/main" w="9525">
+              <a14:hiddenLine xmlns:a14="http://schemas.microsoft.com/office/drawing/2010/main" xmlns="" w="9525">
                 <a:solidFill>
                   <a:schemeClr val="tx1"/>
                 </a:solidFill>
@@ -4903,7 +4927,7 @@
               </a14:hiddenLine>
             </a:ext>
             <a:ext uri="{AF507438-7753-43E0-B8FC-AC1667EBCBE1}">
-              <a14:hiddenEffects xmlns:a14="http://schemas.microsoft.com/office/drawing/2010/main">
+              <a14:hiddenEffects xmlns:a14="http://schemas.microsoft.com/office/drawing/2010/main" xmlns="">
                 <a:effectLst>
                   <a:outerShdw dist="35921" dir="2700000" algn="ctr" rotWithShape="0">
                     <a:schemeClr val="bg2"/>
@@ -4917,7 +4941,7 @@
     </p:spTree>
     <p:extLst>
       <p:ext uri="{BB962C8B-B14F-4D97-AF65-F5344CB8AC3E}">
-        <p14:creationId xmlns:p14="http://schemas.microsoft.com/office/powerpoint/2010/main" val="3734976896"/>
+        <p14:creationId xmlns:p14="http://schemas.microsoft.com/office/powerpoint/2010/main" xmlns="" val="3734976896"/>
       </p:ext>
     </p:extLst>
   </p:cSld>

</xml_diff>